<commit_message>
Class based approach fully functional now
</commit_message>
<xml_diff>
--- a/Simulating Rocket Trajectories Using Thrust Profiles.pptx
+++ b/Simulating Rocket Trajectories Using Thrust Profiles.pptx
@@ -108,6 +108,11 @@
       </a:defRPr>
     </a:lvl9pPr>
   </p:defaultTextStyle>
+  <p:extLst>
+    <p:ext uri="{EFAFB233-063F-42B5-8137-9DF3F51BA10A}">
+      <p15:sldGuideLst xmlns:p15="http://schemas.microsoft.com/office/powerpoint/2012/main"/>
+    </p:ext>
+  </p:extLst>
 </p:presentation>
 </file>
 
@@ -13703,7 +13708,7 @@
                   <a:schemeClr val="bg1"/>
                 </a:solidFill>
               </a:rPr>
-              <a:t>Precision</a:t>
+              <a:t>Environment effects</a:t>
             </a:r>
           </a:p>
           <a:p>
@@ -14051,6 +14056,19 @@
             <a:pPr marL="342900" indent="-342900">
               <a:buAutoNum type="arabicPeriod"/>
             </a:pPr>
+            <a:r>
+              <a:rPr lang="en-US" dirty="0">
+                <a:solidFill>
+                  <a:schemeClr val="bg1"/>
+                </a:solidFill>
+              </a:rPr>
+              <a:t>…</a:t>
+            </a:r>
+          </a:p>
+          <a:p>
+            <a:pPr marL="342900" indent="-342900">
+              <a:buAutoNum type="arabicPeriod"/>
+            </a:pPr>
             <a:endParaRPr lang="en-US" dirty="0">
               <a:solidFill>
                 <a:schemeClr val="bg1"/>
@@ -14503,7 +14521,7 @@
           <a:p>
             <a:r>
               <a:rPr lang="en-US" dirty="0"/>
-              <a:t>Create functions to more accurately describe thrust and air density</a:t>
+              <a:t>Create functions to more accurately describe changing thrust and changing air density</a:t>
             </a:r>
           </a:p>
           <a:p>

</xml_diff>

<commit_message>
Not even sure what I changed :(
</commit_message>
<xml_diff>
--- a/Simulating Rocket Trajectories Using Thrust Profiles.pptx
+++ b/Simulating Rocket Trajectories Using Thrust Profiles.pptx
@@ -451,7 +451,7 @@
           <a:p>
             <a:fld id="{3AA97E9E-6E92-447A-9FA9-BF0117DD2DCD}" type="datetimeFigureOut">
               <a:rPr lang="en-IN" smtClean="0"/>
-              <a:t>18-11-2024</a:t>
+              <a:t>21-11-2024</a:t>
             </a:fld>
             <a:endParaRPr lang="en-IN"/>
           </a:p>
@@ -1539,7 +1539,7 @@
           <a:p>
             <a:fld id="{3AA97E9E-6E92-447A-9FA9-BF0117DD2DCD}" type="datetimeFigureOut">
               <a:rPr lang="en-IN" smtClean="0"/>
-              <a:t>18-11-2024</a:t>
+              <a:t>21-11-2024</a:t>
             </a:fld>
             <a:endParaRPr lang="en-IN"/>
           </a:p>
@@ -2519,7 +2519,7 @@
           <a:p>
             <a:fld id="{3AA97E9E-6E92-447A-9FA9-BF0117DD2DCD}" type="datetimeFigureOut">
               <a:rPr lang="en-IN" smtClean="0"/>
-              <a:t>18-11-2024</a:t>
+              <a:t>21-11-2024</a:t>
             </a:fld>
             <a:endParaRPr lang="en-IN"/>
           </a:p>
@@ -3653,7 +3653,7 @@
           <a:p>
             <a:fld id="{3AA97E9E-6E92-447A-9FA9-BF0117DD2DCD}" type="datetimeFigureOut">
               <a:rPr lang="en-IN" smtClean="0"/>
-              <a:t>18-11-2024</a:t>
+              <a:t>21-11-2024</a:t>
             </a:fld>
             <a:endParaRPr lang="en-IN"/>
           </a:p>
@@ -4686,7 +4686,7 @@
           <a:p>
             <a:fld id="{3AA97E9E-6E92-447A-9FA9-BF0117DD2DCD}" type="datetimeFigureOut">
               <a:rPr lang="en-IN" smtClean="0"/>
-              <a:t>18-11-2024</a:t>
+              <a:t>21-11-2024</a:t>
             </a:fld>
             <a:endParaRPr lang="en-IN"/>
           </a:p>
@@ -5346,7 +5346,7 @@
           <a:p>
             <a:fld id="{3AA97E9E-6E92-447A-9FA9-BF0117DD2DCD}" type="datetimeFigureOut">
               <a:rPr lang="en-IN" smtClean="0"/>
-              <a:t>18-11-2024</a:t>
+              <a:t>21-11-2024</a:t>
             </a:fld>
             <a:endParaRPr lang="en-IN"/>
           </a:p>
@@ -6207,7 +6207,7 @@
           <a:p>
             <a:fld id="{3AA97E9E-6E92-447A-9FA9-BF0117DD2DCD}" type="datetimeFigureOut">
               <a:rPr lang="en-IN" smtClean="0"/>
-              <a:t>18-11-2024</a:t>
+              <a:t>21-11-2024</a:t>
             </a:fld>
             <a:endParaRPr lang="en-IN"/>
           </a:p>
@@ -6397,7 +6397,7 @@
           <a:p>
             <a:fld id="{3AA97E9E-6E92-447A-9FA9-BF0117DD2DCD}" type="datetimeFigureOut">
               <a:rPr lang="en-IN" smtClean="0"/>
-              <a:t>18-11-2024</a:t>
+              <a:t>21-11-2024</a:t>
             </a:fld>
             <a:endParaRPr lang="en-IN"/>
           </a:p>
@@ -7369,7 +7369,7 @@
           <a:p>
             <a:fld id="{3AA97E9E-6E92-447A-9FA9-BF0117DD2DCD}" type="datetimeFigureOut">
               <a:rPr lang="en-IN" smtClean="0"/>
-              <a:t>18-11-2024</a:t>
+              <a:t>21-11-2024</a:t>
             </a:fld>
             <a:endParaRPr lang="en-IN"/>
           </a:p>
@@ -7580,7 +7580,7 @@
           <a:p>
             <a:fld id="{3AA97E9E-6E92-447A-9FA9-BF0117DD2DCD}" type="datetimeFigureOut">
               <a:rPr lang="en-IN" smtClean="0"/>
-              <a:t>18-11-2024</a:t>
+              <a:t>21-11-2024</a:t>
             </a:fld>
             <a:endParaRPr lang="en-IN"/>
           </a:p>
@@ -8614,7 +8614,7 @@
           <a:p>
             <a:fld id="{3AA97E9E-6E92-447A-9FA9-BF0117DD2DCD}" type="datetimeFigureOut">
               <a:rPr lang="en-IN" smtClean="0"/>
-              <a:t>18-11-2024</a:t>
+              <a:t>21-11-2024</a:t>
             </a:fld>
             <a:endParaRPr lang="en-IN"/>
           </a:p>
@@ -8886,7 +8886,7 @@
           <a:p>
             <a:fld id="{3AA97E9E-6E92-447A-9FA9-BF0117DD2DCD}" type="datetimeFigureOut">
               <a:rPr lang="en-IN" smtClean="0"/>
-              <a:t>18-11-2024</a:t>
+              <a:t>21-11-2024</a:t>
             </a:fld>
             <a:endParaRPr lang="en-IN"/>
           </a:p>
@@ -9296,7 +9296,7 @@
           <a:p>
             <a:fld id="{3AA97E9E-6E92-447A-9FA9-BF0117DD2DCD}" type="datetimeFigureOut">
               <a:rPr lang="en-IN" smtClean="0"/>
-              <a:t>18-11-2024</a:t>
+              <a:t>21-11-2024</a:t>
             </a:fld>
             <a:endParaRPr lang="en-IN"/>
           </a:p>
@@ -9423,7 +9423,7 @@
           <a:p>
             <a:fld id="{3AA97E9E-6E92-447A-9FA9-BF0117DD2DCD}" type="datetimeFigureOut">
               <a:rPr lang="en-IN" smtClean="0"/>
-              <a:t>18-11-2024</a:t>
+              <a:t>21-11-2024</a:t>
             </a:fld>
             <a:endParaRPr lang="en-IN"/>
           </a:p>
@@ -9518,7 +9518,7 @@
           <a:p>
             <a:fld id="{3AA97E9E-6E92-447A-9FA9-BF0117DD2DCD}" type="datetimeFigureOut">
               <a:rPr lang="en-IN" smtClean="0"/>
-              <a:t>18-11-2024</a:t>
+              <a:t>21-11-2024</a:t>
             </a:fld>
             <a:endParaRPr lang="en-IN"/>
           </a:p>
@@ -10599,7 +10599,7 @@
           <a:p>
             <a:fld id="{3AA97E9E-6E92-447A-9FA9-BF0117DD2DCD}" type="datetimeFigureOut">
               <a:rPr lang="en-IN" smtClean="0"/>
-              <a:t>18-11-2024</a:t>
+              <a:t>21-11-2024</a:t>
             </a:fld>
             <a:endParaRPr lang="en-IN"/>
           </a:p>
@@ -11707,7 +11707,7 @@
           <a:p>
             <a:fld id="{3AA97E9E-6E92-447A-9FA9-BF0117DD2DCD}" type="datetimeFigureOut">
               <a:rPr lang="en-IN" smtClean="0"/>
-              <a:t>18-11-2024</a:t>
+              <a:t>21-11-2024</a:t>
             </a:fld>
             <a:endParaRPr lang="en-IN"/>
           </a:p>
@@ -12704,7 +12704,7 @@
           <a:p>
             <a:fld id="{3AA97E9E-6E92-447A-9FA9-BF0117DD2DCD}" type="datetimeFigureOut">
               <a:rPr lang="en-IN" smtClean="0"/>
-              <a:t>18-11-2024</a:t>
+              <a:t>21-11-2024</a:t>
             </a:fld>
             <a:endParaRPr lang="en-IN"/>
           </a:p>
@@ -13676,6 +13676,34 @@
           <a:bodyPr rtlCol="0" anchor="ctr"/>
           <a:lstStyle/>
           <a:p>
+            <a:endParaRPr lang="en-US" b="1" u="sng" dirty="0">
+              <a:solidFill>
+                <a:schemeClr val="bg1"/>
+              </a:solidFill>
+            </a:endParaRPr>
+          </a:p>
+          <a:p>
+            <a:endParaRPr lang="en-US" b="1" u="sng" dirty="0">
+              <a:solidFill>
+                <a:schemeClr val="bg1"/>
+              </a:solidFill>
+            </a:endParaRPr>
+          </a:p>
+          <a:p>
+            <a:endParaRPr lang="en-US" b="1" u="sng" dirty="0">
+              <a:solidFill>
+                <a:schemeClr val="bg1"/>
+              </a:solidFill>
+            </a:endParaRPr>
+          </a:p>
+          <a:p>
+            <a:endParaRPr lang="en-US" b="1" u="sng" dirty="0">
+              <a:solidFill>
+                <a:schemeClr val="bg1"/>
+              </a:solidFill>
+            </a:endParaRPr>
+          </a:p>
+          <a:p>
             <a:r>
               <a:rPr lang="en-US" b="1" u="sng" dirty="0">
                 <a:solidFill>
@@ -13709,6 +13737,32 @@
                 </a:solidFill>
               </a:rPr>
               <a:t>Environment effects</a:t>
+            </a:r>
+          </a:p>
+          <a:p>
+            <a:pPr marL="342900" indent="-342900">
+              <a:buAutoNum type="arabicPeriod"/>
+            </a:pPr>
+            <a:r>
+              <a:rPr lang="en-US" dirty="0">
+                <a:solidFill>
+                  <a:schemeClr val="bg1"/>
+                </a:solidFill>
+              </a:rPr>
+              <a:t>Initial alt, velocity</a:t>
+            </a:r>
+          </a:p>
+          <a:p>
+            <a:pPr marL="342900" indent="-342900">
+              <a:buAutoNum type="arabicPeriod"/>
+            </a:pPr>
+            <a:r>
+              <a:rPr lang="en-US" dirty="0">
+                <a:solidFill>
+                  <a:schemeClr val="bg1"/>
+                </a:solidFill>
+              </a:rPr>
+              <a:t>Launch angle</a:t>
             </a:r>
           </a:p>
           <a:p>
@@ -14383,7 +14437,7 @@
             <a:pPr algn="ctr"/>
             <a:r>
               <a:rPr lang="en-US" b="1" dirty="0"/>
-              <a:t>Saturn V Rocket with Rocketdyne F-1 Engine</a:t>
+              <a:t>Saturn V Rocket with 5 Rocketdyne F-1 Engines</a:t>
             </a:r>
             <a:endParaRPr lang="en-IN" b="1" dirty="0"/>
           </a:p>

</xml_diff>